<commit_message>
dodala v ppt, popravila urine periode
</commit_message>
<xml_diff>
--- a/ppt/Pomnenje s kvantnimi celičnimi avtomati.pptx
+++ b/ppt/Pomnenje s kvantnimi celičnimi avtomati.pptx
@@ -113,6 +113,11 @@
       </a:defRPr>
     </a:lvl9pPr>
   </p:defaultTextStyle>
+  <p:extLst>
+    <p:ext uri="{EFAFB233-063F-42B5-8137-9DF3F51BA10A}">
+      <p15:sldGuideLst xmlns:p15="http://schemas.microsoft.com/office/powerpoint/2012/main"/>
+    </p:ext>
+  </p:extLst>
 </p:presentation>
 </file>
 
@@ -6407,13 +6412,243 @@
         </p:nvSpPr>
         <p:spPr/>
         <p:txBody>
-          <a:bodyPr/>
-          <a:lstStyle/>
-          <a:p>
-            <a:r>
-              <a:rPr lang="sl-SI" dirty="0"/>
-              <a:t>??</a:t>
-            </a:r>
+          <a:bodyPr>
+            <a:normAutofit fontScale="85000" lnSpcReduction="10000"/>
+          </a:bodyPr>
+          <a:lstStyle/>
+          <a:p>
+            <a:r>
+              <a:rPr lang="en-US" u="sng" dirty="0" err="1"/>
+              <a:t>Implementacije</a:t>
+            </a:r>
+            <a:r>
+              <a:rPr lang="en-US" dirty="0"/>
+              <a:t> </a:t>
+            </a:r>
+            <a:r>
+              <a:rPr lang="en-US" u="sng" dirty="0" err="1"/>
+              <a:t>delujejo</a:t>
+            </a:r>
+            <a:r>
+              <a:rPr lang="en-US" dirty="0"/>
+              <a:t> </a:t>
+            </a:r>
+            <a:r>
+              <a:rPr lang="en-US" u="sng" dirty="0" err="1"/>
+              <a:t>pravilno</a:t>
+            </a:r>
+            <a:r>
+              <a:rPr lang="en-US" dirty="0"/>
+              <a:t>. </a:t>
+            </a:r>
+          </a:p>
+          <a:p>
+            <a:r>
+              <a:rPr lang="en-US" dirty="0"/>
+              <a:t>1. </a:t>
+            </a:r>
+            <a:r>
+              <a:rPr lang="en-US" dirty="0" err="1"/>
+              <a:t>vir</a:t>
+            </a:r>
+            <a:r>
+              <a:rPr lang="en-US" dirty="0"/>
+              <a:t>: 1 </a:t>
+            </a:r>
+            <a:r>
+              <a:rPr lang="en-US" dirty="0" err="1"/>
+              <a:t>urin</a:t>
+            </a:r>
+            <a:r>
+              <a:rPr lang="en-US" dirty="0"/>
+              <a:t> </a:t>
+            </a:r>
+            <a:r>
+              <a:rPr lang="en-US" dirty="0" err="1"/>
+              <a:t>cikel</a:t>
+            </a:r>
+            <a:r>
+              <a:rPr lang="en-US" dirty="0"/>
+              <a:t> (4 faze)</a:t>
+            </a:r>
+          </a:p>
+          <a:p>
+            <a:pPr lvl="1"/>
+            <a:r>
+              <a:rPr lang="en-US" dirty="0"/>
+              <a:t>Max 1,25 urine </a:t>
+            </a:r>
+            <a:r>
+              <a:rPr lang="en-US" dirty="0" err="1"/>
+              <a:t>periode</a:t>
+            </a:r>
+            <a:endParaRPr lang="en-US" dirty="0"/>
+          </a:p>
+          <a:p>
+            <a:pPr lvl="1"/>
+            <a:r>
+              <a:rPr lang="en-US" dirty="0" err="1"/>
+              <a:t>Preproste</a:t>
+            </a:r>
+            <a:r>
+              <a:rPr lang="en-US" dirty="0"/>
+              <a:t> urine cone</a:t>
+            </a:r>
+          </a:p>
+          <a:p>
+            <a:pPr lvl="1"/>
+            <a:r>
+              <a:rPr lang="en-US" dirty="0" err="1"/>
+              <a:t>Nestandardni</a:t>
+            </a:r>
+            <a:r>
+              <a:rPr lang="en-US" dirty="0"/>
+              <a:t> </a:t>
+            </a:r>
+            <a:r>
+              <a:rPr lang="en-US" dirty="0" err="1"/>
+              <a:t>zamiki</a:t>
+            </a:r>
+            <a:r>
+              <a:rPr lang="en-US" dirty="0"/>
+              <a:t> in </a:t>
+            </a:r>
+            <a:r>
+              <a:rPr lang="en-US" dirty="0" err="1"/>
+              <a:t>zasukane</a:t>
+            </a:r>
+            <a:r>
+              <a:rPr lang="en-US" dirty="0"/>
+              <a:t> </a:t>
+            </a:r>
+            <a:r>
+              <a:rPr lang="en-US" dirty="0" err="1"/>
+              <a:t>celice</a:t>
+            </a:r>
+            <a:endParaRPr lang="en-US" dirty="0"/>
+          </a:p>
+          <a:p>
+            <a:r>
+              <a:rPr lang="en-US" dirty="0"/>
+              <a:t>2. </a:t>
+            </a:r>
+            <a:r>
+              <a:rPr lang="en-US" dirty="0" err="1"/>
+              <a:t>vir</a:t>
+            </a:r>
+            <a:r>
+              <a:rPr lang="en-US" dirty="0"/>
+              <a:t>: 5-6 </a:t>
+            </a:r>
+            <a:r>
+              <a:rPr lang="en-US" dirty="0" err="1"/>
+              <a:t>urinih</a:t>
+            </a:r>
+            <a:r>
+              <a:rPr lang="en-US" dirty="0"/>
+              <a:t> </a:t>
+            </a:r>
+            <a:r>
+              <a:rPr lang="en-US" dirty="0" err="1"/>
+              <a:t>faz</a:t>
+            </a:r>
+            <a:r>
+              <a:rPr lang="en-US" dirty="0"/>
+              <a:t>, </a:t>
+            </a:r>
+            <a:r>
+              <a:rPr lang="en-US" dirty="0" err="1"/>
+              <a:t>manj</a:t>
+            </a:r>
+            <a:r>
+              <a:rPr lang="en-US" dirty="0"/>
+              <a:t> </a:t>
+            </a:r>
+            <a:r>
+              <a:rPr lang="en-US" dirty="0" err="1"/>
+              <a:t>prostora</a:t>
+            </a:r>
+            <a:endParaRPr lang="en-US" dirty="0"/>
+          </a:p>
+          <a:p>
+            <a:pPr lvl="1"/>
+            <a:r>
+              <a:rPr lang="en-US" dirty="0"/>
+              <a:t>Max. 1,5 urine </a:t>
+            </a:r>
+            <a:r>
+              <a:rPr lang="en-US" dirty="0" err="1"/>
+              <a:t>periode</a:t>
+            </a:r>
+            <a:endParaRPr lang="en-US" dirty="0"/>
+          </a:p>
+          <a:p>
+            <a:pPr lvl="1"/>
+            <a:r>
+              <a:rPr lang="en-US" dirty="0" err="1"/>
+              <a:t>Manjša</a:t>
+            </a:r>
+            <a:r>
+              <a:rPr lang="en-US" dirty="0"/>
+              <a:t> </a:t>
+            </a:r>
+            <a:r>
+              <a:rPr lang="en-US" dirty="0" err="1"/>
+              <a:t>površina</a:t>
+            </a:r>
+            <a:endParaRPr lang="en-US" dirty="0"/>
+          </a:p>
+          <a:p>
+            <a:pPr lvl="1"/>
+            <a:r>
+              <a:rPr lang="en-US" dirty="0" err="1"/>
+              <a:t>Kompleksnejše</a:t>
+            </a:r>
+            <a:r>
+              <a:rPr lang="en-US" dirty="0"/>
+              <a:t> </a:t>
+            </a:r>
+            <a:r>
+              <a:rPr lang="en-US" dirty="0" err="1"/>
+              <a:t>oblike</a:t>
+            </a:r>
+            <a:r>
+              <a:rPr lang="en-US" dirty="0"/>
+              <a:t> </a:t>
+            </a:r>
+            <a:r>
+              <a:rPr lang="en-US" dirty="0" err="1"/>
+              <a:t>urinih</a:t>
+            </a:r>
+            <a:r>
+              <a:rPr lang="en-US"/>
+              <a:t> con</a:t>
+            </a:r>
+            <a:endParaRPr lang="en-US" dirty="0"/>
+          </a:p>
+          <a:p>
+            <a:pPr lvl="1"/>
+            <a:r>
+              <a:rPr lang="en-US" dirty="0" err="1"/>
+              <a:t>Podobne</a:t>
+            </a:r>
+            <a:r>
+              <a:rPr lang="en-US" dirty="0"/>
+              <a:t> structure za </a:t>
+            </a:r>
+            <a:r>
+              <a:rPr lang="en-US" dirty="0" err="1"/>
+              <a:t>vse</a:t>
+            </a:r>
+            <a:r>
+              <a:rPr lang="en-US" dirty="0"/>
+              <a:t> </a:t>
+            </a:r>
+            <a:r>
+              <a:rPr lang="en-US" dirty="0" err="1"/>
+              <a:t>celice</a:t>
+            </a:r>
+            <a:endParaRPr lang="en-US" dirty="0"/>
           </a:p>
         </p:txBody>
       </p:sp>
@@ -6584,7 +6819,7 @@
           <a:graphicData uri="http://schemas.openxmlformats.org/presentationml/2006/ole">
             <mc:AlternateContent xmlns:mc="http://schemas.openxmlformats.org/markup-compatibility/2006">
               <mc:Choice xmlns:v="urn:schemas-microsoft-com:vml" Requires="v">
-                <p:oleObj spid="_x0000_s1028" name="Acrobat Document" r:id="rId3" imgW="5400359" imgH="5400587" progId="AcroExch.Document.DC">
+                <p:oleObj spid="_x0000_s1034" name="Acrobat Document" r:id="rId3" imgW="5400359" imgH="5400587" progId="AcroExch.Document.DC">
                   <p:embed/>
                 </p:oleObj>
               </mc:Choice>
@@ -7174,8 +7409,28 @@
           </a:p>
           <a:p>
             <a:r>
-              <a:rPr lang="sl-SI" dirty="0"/>
-              <a:t>1,25 urine periode zamika</a:t>
+              <a:rPr lang="en-US" dirty="0"/>
+              <a:t>1,25</a:t>
+            </a:r>
+            <a:r>
+              <a:rPr lang="sl-SI" dirty="0"/>
+              <a:t> urin</a:t>
+            </a:r>
+            <a:r>
+              <a:rPr lang="en-US" dirty="0"/>
+              <a:t>e</a:t>
+            </a:r>
+            <a:r>
+              <a:rPr lang="sl-SI" dirty="0"/>
+              <a:t> period</a:t>
+            </a:r>
+            <a:r>
+              <a:rPr lang="en-US" dirty="0"/>
+              <a:t>e </a:t>
+            </a:r>
+            <a:r>
+              <a:rPr lang="sl-SI" dirty="0"/>
+              <a:t>zamika</a:t>
             </a:r>
           </a:p>
           <a:p>
@@ -7254,22 +7509,47 @@
           <a:p>
             <a:r>
               <a:rPr lang="sl-SI" dirty="0"/>
-              <a:t>1 urina perioda zamika</a:t>
-            </a:r>
-          </a:p>
-          <a:p>
-            <a:r>
-              <a:rPr lang="sl-SI" dirty="0"/>
-              <a:t>Nepričakovano obnašanje: d=1, q=1 vrne D</a:t>
-            </a:r>
-            <a:r>
-              <a:rPr lang="sl-SI" baseline="30000" dirty="0"/>
               <a:t>1</a:t>
             </a:r>
             <a:r>
-              <a:rPr lang="sl-SI" dirty="0"/>
-              <a:t>q=0</a:t>
-            </a:r>
+              <a:rPr lang="en-US" dirty="0"/>
+              <a:t> </a:t>
+            </a:r>
+            <a:r>
+              <a:rPr lang="sl-SI" dirty="0"/>
+              <a:t>urin</a:t>
+            </a:r>
+            <a:r>
+              <a:rPr lang="en-US" dirty="0"/>
+              <a:t>a</a:t>
+            </a:r>
+            <a:r>
+              <a:rPr lang="sl-SI" dirty="0"/>
+              <a:t> period</a:t>
+            </a:r>
+            <a:r>
+              <a:rPr lang="en-US" dirty="0"/>
+              <a:t>a</a:t>
+            </a:r>
+            <a:r>
+              <a:rPr lang="sl-SI" dirty="0"/>
+              <a:t> zamika</a:t>
+            </a:r>
+          </a:p>
+          <a:p>
+            <a:r>
+              <a:rPr lang="en-US" dirty="0" err="1"/>
+              <a:t>Pričakovano</a:t>
+            </a:r>
+            <a:r>
+              <a:rPr lang="en-US" dirty="0"/>
+              <a:t> </a:t>
+            </a:r>
+            <a:r>
+              <a:rPr lang="en-US" dirty="0" err="1"/>
+              <a:t>obnašanje</a:t>
+            </a:r>
+            <a:endParaRPr lang="sl-SI" dirty="0"/>
           </a:p>
         </p:txBody>
       </p:sp>
@@ -7477,14 +7757,50 @@
           <a:p>
             <a:r>
               <a:rPr lang="sl-SI" dirty="0"/>
-              <a:t>1,25 urine periode zamika</a:t>
-            </a:r>
-          </a:p>
-          <a:p>
-            <a:r>
-              <a:rPr lang="sl-SI" dirty="0"/>
-              <a:t>??</a:t>
-            </a:r>
+              <a:t>1</a:t>
+            </a:r>
+            <a:r>
+              <a:rPr lang="en-US" dirty="0"/>
+              <a:t>,25</a:t>
+            </a:r>
+            <a:r>
+              <a:rPr lang="sl-SI" dirty="0"/>
+              <a:t> urin</a:t>
+            </a:r>
+            <a:r>
+              <a:rPr lang="en-US" dirty="0"/>
+              <a:t>e</a:t>
+            </a:r>
+            <a:r>
+              <a:rPr lang="sl-SI" dirty="0"/>
+              <a:t> period</a:t>
+            </a:r>
+            <a:r>
+              <a:rPr lang="en-US" dirty="0"/>
+              <a:t>e</a:t>
+            </a:r>
+            <a:r>
+              <a:rPr lang="sl-SI" dirty="0"/>
+              <a:t> zamika</a:t>
+            </a:r>
+          </a:p>
+          <a:p>
+            <a:r>
+              <a:rPr lang="en-US" dirty="0" err="1"/>
+              <a:t>Pričakovano</a:t>
+            </a:r>
+            <a:r>
+              <a:rPr lang="en-US" dirty="0"/>
+              <a:t> </a:t>
+            </a:r>
+            <a:r>
+              <a:rPr lang="en-US" dirty="0" err="1"/>
+              <a:t>obnašanje</a:t>
+            </a:r>
+            <a:endParaRPr lang="sl-SI" dirty="0"/>
+          </a:p>
+          <a:p>
+            <a:endParaRPr lang="sl-SI" dirty="0"/>
           </a:p>
         </p:txBody>
       </p:sp>
@@ -7561,9 +7877,21 @@
           </a:p>
           <a:p>
             <a:r>
-              <a:rPr lang="sl-SI" dirty="0"/>
-              <a:t>??</a:t>
-            </a:r>
+              <a:rPr lang="en-US" dirty="0" err="1"/>
+              <a:t>Pričakovano</a:t>
+            </a:r>
+            <a:r>
+              <a:rPr lang="en-US" dirty="0"/>
+              <a:t> </a:t>
+            </a:r>
+            <a:r>
+              <a:rPr lang="en-US" dirty="0" err="1"/>
+              <a:t>obnašanje</a:t>
+            </a:r>
+            <a:endParaRPr lang="sl-SI" dirty="0"/>
+          </a:p>
+          <a:p>
+            <a:endParaRPr lang="sl-SI" dirty="0"/>
           </a:p>
         </p:txBody>
       </p:sp>
@@ -7776,9 +8104,21 @@
           </a:p>
           <a:p>
             <a:r>
-              <a:rPr lang="sl-SI" dirty="0"/>
-              <a:t>??</a:t>
-            </a:r>
+              <a:rPr lang="en-US" dirty="0" err="1"/>
+              <a:t>Pričakovano</a:t>
+            </a:r>
+            <a:r>
+              <a:rPr lang="en-US" dirty="0"/>
+              <a:t> </a:t>
+            </a:r>
+            <a:r>
+              <a:rPr lang="en-US" dirty="0" err="1"/>
+              <a:t>obnašanje</a:t>
+            </a:r>
+            <a:endParaRPr lang="sl-SI" dirty="0"/>
+          </a:p>
+          <a:p>
+            <a:endParaRPr lang="sl-SI" dirty="0"/>
           </a:p>
         </p:txBody>
       </p:sp>
@@ -7860,9 +8200,21 @@
           </a:p>
           <a:p>
             <a:r>
-              <a:rPr lang="sl-SI" dirty="0"/>
-              <a:t>??</a:t>
-            </a:r>
+              <a:rPr lang="en-US" dirty="0" err="1"/>
+              <a:t>Pričakovano</a:t>
+            </a:r>
+            <a:r>
+              <a:rPr lang="en-US" dirty="0"/>
+              <a:t> </a:t>
+            </a:r>
+            <a:r>
+              <a:rPr lang="en-US" dirty="0" err="1"/>
+              <a:t>obnašanje</a:t>
+            </a:r>
+            <a:endParaRPr lang="sl-SI" dirty="0"/>
+          </a:p>
+          <a:p>
+            <a:endParaRPr lang="sl-SI" dirty="0"/>
           </a:p>
         </p:txBody>
       </p:sp>
@@ -8075,9 +8427,21 @@
           </a:p>
           <a:p>
             <a:r>
-              <a:rPr lang="sl-SI" dirty="0"/>
-              <a:t>??</a:t>
-            </a:r>
+              <a:rPr lang="en-US" dirty="0" err="1"/>
+              <a:t>Pričakovano</a:t>
+            </a:r>
+            <a:r>
+              <a:rPr lang="en-US" dirty="0"/>
+              <a:t> </a:t>
+            </a:r>
+            <a:r>
+              <a:rPr lang="en-US" dirty="0" err="1"/>
+              <a:t>obnašanje</a:t>
+            </a:r>
+            <a:endParaRPr lang="sl-SI" dirty="0"/>
+          </a:p>
+          <a:p>
+            <a:endParaRPr lang="sl-SI" dirty="0"/>
           </a:p>
         </p:txBody>
       </p:sp>
@@ -8159,9 +8523,21 @@
           </a:p>
           <a:p>
             <a:r>
-              <a:rPr lang="sl-SI" dirty="0"/>
-              <a:t>??</a:t>
-            </a:r>
+              <a:rPr lang="en-US" dirty="0" err="1"/>
+              <a:t>Pričakovano</a:t>
+            </a:r>
+            <a:r>
+              <a:rPr lang="en-US" dirty="0"/>
+              <a:t> </a:t>
+            </a:r>
+            <a:r>
+              <a:rPr lang="en-US" dirty="0" err="1"/>
+              <a:t>obnašanje</a:t>
+            </a:r>
+            <a:endParaRPr lang="sl-SI" dirty="0"/>
+          </a:p>
+          <a:p>
+            <a:endParaRPr lang="sl-SI" dirty="0"/>
           </a:p>
         </p:txBody>
       </p:sp>

</xml_diff>